<commit_message>
Se cargan últimos cambios
</commit_message>
<xml_diff>
--- a/Dashboard empresa de ventas inmobiliarias.pptx
+++ b/Dashboard empresa de ventas inmobiliarias.pptx
@@ -19,7 +19,8 @@
     <p:sldId id="266" r:id="rId13"/>
     <p:sldId id="267" r:id="rId14"/>
     <p:sldId id="268" r:id="rId15"/>
-    <p:sldId id="269" r:id="rId16"/>
+    <p:sldId id="271" r:id="rId16"/>
+    <p:sldId id="269" r:id="rId17"/>
   </p:sldIdLst>
   <p:sldSz cx="12192000" cy="6858000"/>
   <p:notesSz cx="6858000" cy="9144000"/>
@@ -176,7 +177,7 @@
           <a:noFill/>
           <a:extLst>
             <a:ext uri="{909E8E84-426E-40dd-AFC4-6F175D3DCCD1}">
-              <a14:hiddenFill xmlns="" xmlns:a14="http://schemas.microsoft.com/office/drawing/2010/main">
+              <a14:hiddenFill xmlns:a14="http://schemas.microsoft.com/office/drawing/2010/main" xmlns="">
                 <a:solidFill>
                   <a:srgbClr val="FFFFFF"/>
                 </a:solidFill>
@@ -236,7 +237,7 @@
             </a:ln>
             <a:extLst>
               <a:ext uri="{91240B29-F687-4f45-9708-019B960494DF}">
-                <a14:hiddenLine xmlns="" xmlns:a14="http://schemas.microsoft.com/office/drawing/2010/main" w="9525">
+                <a14:hiddenLine xmlns:a14="http://schemas.microsoft.com/office/drawing/2010/main" xmlns="" w="9525">
                   <a:solidFill>
                     <a:srgbClr val="000000"/>
                   </a:solidFill>
@@ -326,7 +327,7 @@
             </a:ln>
             <a:extLst>
               <a:ext uri="{91240B29-F687-4f45-9708-019B960494DF}">
-                <a14:hiddenLine xmlns="" xmlns:a14="http://schemas.microsoft.com/office/drawing/2010/main" w="9525">
+                <a14:hiddenLine xmlns:a14="http://schemas.microsoft.com/office/drawing/2010/main" xmlns="" w="9525">
                   <a:solidFill>
                     <a:srgbClr val="000000"/>
                   </a:solidFill>
@@ -416,7 +417,7 @@
             </a:ln>
             <a:extLst>
               <a:ext uri="{91240B29-F687-4f45-9708-019B960494DF}">
-                <a14:hiddenLine xmlns="" xmlns:a14="http://schemas.microsoft.com/office/drawing/2010/main" w="9525">
+                <a14:hiddenLine xmlns:a14="http://schemas.microsoft.com/office/drawing/2010/main" xmlns="" w="9525">
                   <a:solidFill>
                     <a:srgbClr val="000000"/>
                   </a:solidFill>
@@ -450,7 +451,7 @@
             </a:ln>
             <a:extLst>
               <a:ext uri="{91240B29-F687-4f45-9708-019B960494DF}">
-                <a14:hiddenLine xmlns="" xmlns:a14="http://schemas.microsoft.com/office/drawing/2010/main" w="9525">
+                <a14:hiddenLine xmlns:a14="http://schemas.microsoft.com/office/drawing/2010/main" xmlns="" w="9525">
                   <a:solidFill>
                     <a:srgbClr val="000000"/>
                   </a:solidFill>
@@ -540,7 +541,7 @@
             </a:ln>
             <a:extLst>
               <a:ext uri="{91240B29-F687-4f45-9708-019B960494DF}">
-                <a14:hiddenLine xmlns="" xmlns:a14="http://schemas.microsoft.com/office/drawing/2010/main" w="9525">
+                <a14:hiddenLine xmlns:a14="http://schemas.microsoft.com/office/drawing/2010/main" xmlns="" w="9525">
                   <a:solidFill>
                     <a:srgbClr val="000000"/>
                   </a:solidFill>
@@ -602,7 +603,7 @@
             </a:ln>
             <a:extLst>
               <a:ext uri="{91240B29-F687-4f45-9708-019B960494DF}">
-                <a14:hiddenLine xmlns="" xmlns:a14="http://schemas.microsoft.com/office/drawing/2010/main" w="9525">
+                <a14:hiddenLine xmlns:a14="http://schemas.microsoft.com/office/drawing/2010/main" xmlns="" w="9525">
                   <a:solidFill>
                     <a:srgbClr val="000000"/>
                   </a:solidFill>
@@ -664,7 +665,7 @@
             </a:ln>
             <a:extLst>
               <a:ext uri="{91240B29-F687-4f45-9708-019B960494DF}">
-                <a14:hiddenLine xmlns="" xmlns:a14="http://schemas.microsoft.com/office/drawing/2010/main" w="9525">
+                <a14:hiddenLine xmlns:a14="http://schemas.microsoft.com/office/drawing/2010/main" xmlns="" w="9525">
                   <a:solidFill>
                     <a:srgbClr val="000000"/>
                   </a:solidFill>
@@ -754,7 +755,7 @@
             </a:ln>
             <a:extLst>
               <a:ext uri="{91240B29-F687-4f45-9708-019B960494DF}">
-                <a14:hiddenLine xmlns="" xmlns:a14="http://schemas.microsoft.com/office/drawing/2010/main" w="9525">
+                <a14:hiddenLine xmlns:a14="http://schemas.microsoft.com/office/drawing/2010/main" xmlns="" w="9525">
                   <a:solidFill>
                     <a:srgbClr val="000000"/>
                   </a:solidFill>
@@ -816,7 +817,7 @@
             </a:ln>
             <a:extLst>
               <a:ext uri="{91240B29-F687-4f45-9708-019B960494DF}">
-                <a14:hiddenLine xmlns="" xmlns:a14="http://schemas.microsoft.com/office/drawing/2010/main" w="9525">
+                <a14:hiddenLine xmlns:a14="http://schemas.microsoft.com/office/drawing/2010/main" xmlns="" w="9525">
                   <a:solidFill>
                     <a:srgbClr val="000000"/>
                   </a:solidFill>
@@ -878,7 +879,7 @@
             </a:ln>
             <a:extLst>
               <a:ext uri="{91240B29-F687-4f45-9708-019B960494DF}">
-                <a14:hiddenLine xmlns="" xmlns:a14="http://schemas.microsoft.com/office/drawing/2010/main" w="9525">
+                <a14:hiddenLine xmlns:a14="http://schemas.microsoft.com/office/drawing/2010/main" xmlns="" w="9525">
                   <a:solidFill>
                     <a:srgbClr val="000000"/>
                   </a:solidFill>
@@ -968,7 +969,7 @@
             </a:ln>
             <a:extLst>
               <a:ext uri="{91240B29-F687-4f45-9708-019B960494DF}">
-                <a14:hiddenLine xmlns="" xmlns:a14="http://schemas.microsoft.com/office/drawing/2010/main" w="9525">
+                <a14:hiddenLine xmlns:a14="http://schemas.microsoft.com/office/drawing/2010/main" xmlns="" w="9525">
                   <a:solidFill>
                     <a:srgbClr val="000000"/>
                   </a:solidFill>
@@ -1058,7 +1059,7 @@
             </a:ln>
             <a:extLst>
               <a:ext uri="{91240B29-F687-4f45-9708-019B960494DF}">
-                <a14:hiddenLine xmlns="" xmlns:a14="http://schemas.microsoft.com/office/drawing/2010/main" w="9525">
+                <a14:hiddenLine xmlns:a14="http://schemas.microsoft.com/office/drawing/2010/main" xmlns="" w="9525">
                   <a:solidFill>
                     <a:srgbClr val="000000"/>
                   </a:solidFill>
@@ -1120,7 +1121,7 @@
             </a:ln>
             <a:extLst>
               <a:ext uri="{91240B29-F687-4f45-9708-019B960494DF}">
-                <a14:hiddenLine xmlns="" xmlns:a14="http://schemas.microsoft.com/office/drawing/2010/main" w="9525">
+                <a14:hiddenLine xmlns:a14="http://schemas.microsoft.com/office/drawing/2010/main" xmlns="" w="9525">
                   <a:solidFill>
                     <a:srgbClr val="000000"/>
                   </a:solidFill>
@@ -1230,7 +1231,7 @@
             </a:ln>
             <a:extLst>
               <a:ext uri="{91240B29-F687-4f45-9708-019B960494DF}">
-                <a14:hiddenLine xmlns="" xmlns:a14="http://schemas.microsoft.com/office/drawing/2010/main" w="9525">
+                <a14:hiddenLine xmlns:a14="http://schemas.microsoft.com/office/drawing/2010/main" xmlns="" w="9525">
                   <a:solidFill>
                     <a:srgbClr val="000000"/>
                   </a:solidFill>
@@ -1292,7 +1293,7 @@
             </a:ln>
             <a:extLst>
               <a:ext uri="{91240B29-F687-4f45-9708-019B960494DF}">
-                <a14:hiddenLine xmlns="" xmlns:a14="http://schemas.microsoft.com/office/drawing/2010/main" w="9525">
+                <a14:hiddenLine xmlns:a14="http://schemas.microsoft.com/office/drawing/2010/main" xmlns="" w="9525">
                   <a:solidFill>
                     <a:srgbClr val="000000"/>
                   </a:solidFill>
@@ -1382,7 +1383,7 @@
             </a:ln>
             <a:extLst>
               <a:ext uri="{91240B29-F687-4f45-9708-019B960494DF}">
-                <a14:hiddenLine xmlns="" xmlns:a14="http://schemas.microsoft.com/office/drawing/2010/main" w="9525">
+                <a14:hiddenLine xmlns:a14="http://schemas.microsoft.com/office/drawing/2010/main" xmlns="" w="9525">
                   <a:solidFill>
                     <a:srgbClr val="000000"/>
                   </a:solidFill>
@@ -1472,7 +1473,7 @@
             </a:ln>
             <a:extLst>
               <a:ext uri="{91240B29-F687-4f45-9708-019B960494DF}">
-                <a14:hiddenLine xmlns="" xmlns:a14="http://schemas.microsoft.com/office/drawing/2010/main" w="9525">
+                <a14:hiddenLine xmlns:a14="http://schemas.microsoft.com/office/drawing/2010/main" xmlns="" w="9525">
                   <a:solidFill>
                     <a:srgbClr val="000000"/>
                   </a:solidFill>
@@ -1534,7 +1535,7 @@
             </a:ln>
             <a:extLst>
               <a:ext uri="{91240B29-F687-4f45-9708-019B960494DF}">
-                <a14:hiddenLine xmlns="" xmlns:a14="http://schemas.microsoft.com/office/drawing/2010/main" w="9525">
+                <a14:hiddenLine xmlns:a14="http://schemas.microsoft.com/office/drawing/2010/main" xmlns="" w="9525">
                   <a:solidFill>
                     <a:srgbClr val="000000"/>
                   </a:solidFill>
@@ -1624,7 +1625,7 @@
             </a:ln>
             <a:extLst>
               <a:ext uri="{91240B29-F687-4f45-9708-019B960494DF}">
-                <a14:hiddenLine xmlns="" xmlns:a14="http://schemas.microsoft.com/office/drawing/2010/main" w="9525">
+                <a14:hiddenLine xmlns:a14="http://schemas.microsoft.com/office/drawing/2010/main" xmlns="" w="9525">
                   <a:solidFill>
                     <a:srgbClr val="000000"/>
                   </a:solidFill>
@@ -1714,7 +1715,7 @@
             </a:ln>
             <a:extLst>
               <a:ext uri="{91240B29-F687-4f45-9708-019B960494DF}">
-                <a14:hiddenLine xmlns="" xmlns:a14="http://schemas.microsoft.com/office/drawing/2010/main" w="9525">
+                <a14:hiddenLine xmlns:a14="http://schemas.microsoft.com/office/drawing/2010/main" xmlns="" w="9525">
                   <a:solidFill>
                     <a:srgbClr val="000000"/>
                   </a:solidFill>
@@ -1770,7 +1771,7 @@
             </a:ln>
             <a:extLst>
               <a:ext uri="{91240B29-F687-4f45-9708-019B960494DF}">
-                <a14:hiddenLine xmlns="" xmlns:a14="http://schemas.microsoft.com/office/drawing/2010/main" w="9525">
+                <a14:hiddenLine xmlns:a14="http://schemas.microsoft.com/office/drawing/2010/main" xmlns="" w="9525">
                   <a:solidFill>
                     <a:srgbClr val="000000"/>
                   </a:solidFill>
@@ -1860,7 +1861,7 @@
             </a:ln>
             <a:extLst>
               <a:ext uri="{91240B29-F687-4f45-9708-019B960494DF}">
-                <a14:hiddenLine xmlns="" xmlns:a14="http://schemas.microsoft.com/office/drawing/2010/main" w="9525">
+                <a14:hiddenLine xmlns:a14="http://schemas.microsoft.com/office/drawing/2010/main" xmlns="" w="9525">
                   <a:solidFill>
                     <a:srgbClr val="000000"/>
                   </a:solidFill>
@@ -1916,7 +1917,7 @@
             </a:ln>
             <a:extLst>
               <a:ext uri="{91240B29-F687-4f45-9708-019B960494DF}">
-                <a14:hiddenLine xmlns="" xmlns:a14="http://schemas.microsoft.com/office/drawing/2010/main" w="9525">
+                <a14:hiddenLine xmlns:a14="http://schemas.microsoft.com/office/drawing/2010/main" xmlns="" w="9525">
                   <a:solidFill>
                     <a:srgbClr val="000000"/>
                   </a:solidFill>
@@ -2006,7 +2007,7 @@
             </a:ln>
             <a:extLst>
               <a:ext uri="{91240B29-F687-4f45-9708-019B960494DF}">
-                <a14:hiddenLine xmlns="" xmlns:a14="http://schemas.microsoft.com/office/drawing/2010/main" w="9525">
+                <a14:hiddenLine xmlns:a14="http://schemas.microsoft.com/office/drawing/2010/main" xmlns="" w="9525">
                   <a:solidFill>
                     <a:srgbClr val="000000"/>
                   </a:solidFill>
@@ -2074,7 +2075,7 @@
             </a:ln>
             <a:extLst>
               <a:ext uri="{91240B29-F687-4f45-9708-019B960494DF}">
-                <a14:hiddenLine xmlns="" xmlns:a14="http://schemas.microsoft.com/office/drawing/2010/main" w="9525">
+                <a14:hiddenLine xmlns:a14="http://schemas.microsoft.com/office/drawing/2010/main" xmlns="" w="9525">
                   <a:solidFill>
                     <a:srgbClr val="000000"/>
                   </a:solidFill>
@@ -2164,7 +2165,7 @@
             </a:ln>
             <a:extLst>
               <a:ext uri="{91240B29-F687-4f45-9708-019B960494DF}">
-                <a14:hiddenLine xmlns="" xmlns:a14="http://schemas.microsoft.com/office/drawing/2010/main" w="9525">
+                <a14:hiddenLine xmlns:a14="http://schemas.microsoft.com/office/drawing/2010/main" xmlns="" w="9525">
                   <a:solidFill>
                     <a:srgbClr val="000000"/>
                   </a:solidFill>
@@ -2232,7 +2233,7 @@
             </a:ln>
             <a:extLst>
               <a:ext uri="{91240B29-F687-4f45-9708-019B960494DF}">
-                <a14:hiddenLine xmlns="" xmlns:a14="http://schemas.microsoft.com/office/drawing/2010/main" w="9525">
+                <a14:hiddenLine xmlns:a14="http://schemas.microsoft.com/office/drawing/2010/main" xmlns="" w="9525">
                   <a:solidFill>
                     <a:srgbClr val="000000"/>
                   </a:solidFill>
@@ -2322,7 +2323,7 @@
             </a:ln>
             <a:extLst>
               <a:ext uri="{91240B29-F687-4f45-9708-019B960494DF}">
-                <a14:hiddenLine xmlns="" xmlns:a14="http://schemas.microsoft.com/office/drawing/2010/main" w="9525">
+                <a14:hiddenLine xmlns:a14="http://schemas.microsoft.com/office/drawing/2010/main" xmlns="" w="9525">
                   <a:solidFill>
                     <a:srgbClr val="000000"/>
                   </a:solidFill>
@@ -2356,7 +2357,7 @@
             </a:ln>
             <a:extLst>
               <a:ext uri="{91240B29-F687-4f45-9708-019B960494DF}">
-                <a14:hiddenLine xmlns="" xmlns:a14="http://schemas.microsoft.com/office/drawing/2010/main" w="9525">
+                <a14:hiddenLine xmlns:a14="http://schemas.microsoft.com/office/drawing/2010/main" xmlns="" w="9525">
                   <a:solidFill>
                     <a:srgbClr val="000000"/>
                   </a:solidFill>
@@ -2446,7 +2447,7 @@
             </a:ln>
             <a:extLst>
               <a:ext uri="{91240B29-F687-4f45-9708-019B960494DF}">
-                <a14:hiddenLine xmlns="" xmlns:a14="http://schemas.microsoft.com/office/drawing/2010/main" w="9525">
+                <a14:hiddenLine xmlns:a14="http://schemas.microsoft.com/office/drawing/2010/main" xmlns="" w="9525">
                   <a:solidFill>
                     <a:srgbClr val="000000"/>
                   </a:solidFill>
@@ -2508,7 +2509,7 @@
             </a:ln>
             <a:extLst>
               <a:ext uri="{91240B29-F687-4f45-9708-019B960494DF}">
-                <a14:hiddenLine xmlns="" xmlns:a14="http://schemas.microsoft.com/office/drawing/2010/main" w="9525">
+                <a14:hiddenLine xmlns:a14="http://schemas.microsoft.com/office/drawing/2010/main" xmlns="" w="9525">
                   <a:solidFill>
                     <a:srgbClr val="000000"/>
                   </a:solidFill>
@@ -2570,7 +2571,7 @@
             </a:ln>
             <a:extLst>
               <a:ext uri="{91240B29-F687-4f45-9708-019B960494DF}">
-                <a14:hiddenLine xmlns="" xmlns:a14="http://schemas.microsoft.com/office/drawing/2010/main" w="9525">
+                <a14:hiddenLine xmlns:a14="http://schemas.microsoft.com/office/drawing/2010/main" xmlns="" w="9525">
                   <a:solidFill>
                     <a:srgbClr val="000000"/>
                   </a:solidFill>
@@ -2660,7 +2661,7 @@
             </a:ln>
             <a:extLst>
               <a:ext uri="{91240B29-F687-4f45-9708-019B960494DF}">
-                <a14:hiddenLine xmlns="" xmlns:a14="http://schemas.microsoft.com/office/drawing/2010/main" w="9525">
+                <a14:hiddenLine xmlns:a14="http://schemas.microsoft.com/office/drawing/2010/main" xmlns="" w="9525">
                   <a:solidFill>
                     <a:srgbClr val="000000"/>
                   </a:solidFill>
@@ -2728,7 +2729,7 @@
             </a:ln>
             <a:extLst>
               <a:ext uri="{91240B29-F687-4f45-9708-019B960494DF}">
-                <a14:hiddenLine xmlns="" xmlns:a14="http://schemas.microsoft.com/office/drawing/2010/main" w="9525">
+                <a14:hiddenLine xmlns:a14="http://schemas.microsoft.com/office/drawing/2010/main" xmlns="" w="9525">
                   <a:solidFill>
                     <a:srgbClr val="000000"/>
                   </a:solidFill>
@@ -2790,7 +2791,7 @@
             </a:ln>
             <a:extLst>
               <a:ext uri="{91240B29-F687-4f45-9708-019B960494DF}">
-                <a14:hiddenLine xmlns="" xmlns:a14="http://schemas.microsoft.com/office/drawing/2010/main" w="9525">
+                <a14:hiddenLine xmlns:a14="http://schemas.microsoft.com/office/drawing/2010/main" xmlns="" w="9525">
                   <a:solidFill>
                     <a:srgbClr val="000000"/>
                   </a:solidFill>
@@ -2880,7 +2881,7 @@
             </a:ln>
             <a:extLst>
               <a:ext uri="{91240B29-F687-4f45-9708-019B960494DF}">
-                <a14:hiddenLine xmlns="" xmlns:a14="http://schemas.microsoft.com/office/drawing/2010/main" w="9525">
+                <a14:hiddenLine xmlns:a14="http://schemas.microsoft.com/office/drawing/2010/main" xmlns="" w="9525">
                   <a:solidFill>
                     <a:srgbClr val="000000"/>
                   </a:solidFill>
@@ -2942,7 +2943,7 @@
             </a:ln>
             <a:extLst>
               <a:ext uri="{91240B29-F687-4f45-9708-019B960494DF}">
-                <a14:hiddenLine xmlns="" xmlns:a14="http://schemas.microsoft.com/office/drawing/2010/main" w="9525">
+                <a14:hiddenLine xmlns:a14="http://schemas.microsoft.com/office/drawing/2010/main" xmlns="" w="9525">
                   <a:solidFill>
                     <a:srgbClr val="000000"/>
                   </a:solidFill>
@@ -3032,7 +3033,7 @@
             </a:ln>
             <a:extLst>
               <a:ext uri="{91240B29-F687-4f45-9708-019B960494DF}">
-                <a14:hiddenLine xmlns="" xmlns:a14="http://schemas.microsoft.com/office/drawing/2010/main" w="9525">
+                <a14:hiddenLine xmlns:a14="http://schemas.microsoft.com/office/drawing/2010/main" xmlns="" w="9525">
                   <a:solidFill>
                     <a:srgbClr val="000000"/>
                   </a:solidFill>
@@ -3094,7 +3095,7 @@
             </a:ln>
             <a:extLst>
               <a:ext uri="{91240B29-F687-4f45-9708-019B960494DF}">
-                <a14:hiddenLine xmlns="" xmlns:a14="http://schemas.microsoft.com/office/drawing/2010/main" w="9525">
+                <a14:hiddenLine xmlns:a14="http://schemas.microsoft.com/office/drawing/2010/main" xmlns="" w="9525">
                   <a:solidFill>
                     <a:srgbClr val="000000"/>
                   </a:solidFill>
@@ -3184,7 +3185,7 @@
             </a:ln>
             <a:extLst>
               <a:ext uri="{91240B29-F687-4f45-9708-019B960494DF}">
-                <a14:hiddenLine xmlns="" xmlns:a14="http://schemas.microsoft.com/office/drawing/2010/main" w="9525">
+                <a14:hiddenLine xmlns:a14="http://schemas.microsoft.com/office/drawing/2010/main" xmlns="" w="9525">
                   <a:solidFill>
                     <a:srgbClr val="000000"/>
                   </a:solidFill>
@@ -3218,7 +3219,7 @@
             </a:ln>
             <a:extLst>
               <a:ext uri="{91240B29-F687-4f45-9708-019B960494DF}">
-                <a14:hiddenLine xmlns="" xmlns:a14="http://schemas.microsoft.com/office/drawing/2010/main" w="9525">
+                <a14:hiddenLine xmlns:a14="http://schemas.microsoft.com/office/drawing/2010/main" xmlns="" w="9525">
                   <a:solidFill>
                     <a:srgbClr val="000000"/>
                   </a:solidFill>
@@ -3283,7 +3284,7 @@
             </a:ln>
             <a:extLst>
               <a:ext uri="{91240B29-F687-4f45-9708-019B960494DF}">
-                <a14:hiddenLine xmlns="" xmlns:a14="http://schemas.microsoft.com/office/drawing/2010/main" w="9525">
+                <a14:hiddenLine xmlns:a14="http://schemas.microsoft.com/office/drawing/2010/main" xmlns="" w="9525">
                   <a:solidFill>
                     <a:srgbClr val="000000"/>
                   </a:solidFill>
@@ -3373,7 +3374,7 @@
             </a:ln>
             <a:extLst>
               <a:ext uri="{91240B29-F687-4f45-9708-019B960494DF}">
-                <a14:hiddenLine xmlns="" xmlns:a14="http://schemas.microsoft.com/office/drawing/2010/main" w="9525">
+                <a14:hiddenLine xmlns:a14="http://schemas.microsoft.com/office/drawing/2010/main" xmlns="" w="9525">
                   <a:solidFill>
                     <a:srgbClr val="000000"/>
                   </a:solidFill>
@@ -3435,7 +3436,7 @@
             </a:ln>
             <a:extLst>
               <a:ext uri="{91240B29-F687-4f45-9708-019B960494DF}">
-                <a14:hiddenLine xmlns="" xmlns:a14="http://schemas.microsoft.com/office/drawing/2010/main" w="9525">
+                <a14:hiddenLine xmlns:a14="http://schemas.microsoft.com/office/drawing/2010/main" xmlns="" w="9525">
                   <a:solidFill>
                     <a:srgbClr val="000000"/>
                   </a:solidFill>
@@ -3525,7 +3526,7 @@
             </a:ln>
             <a:extLst>
               <a:ext uri="{91240B29-F687-4f45-9708-019B960494DF}">
-                <a14:hiddenLine xmlns="" xmlns:a14="http://schemas.microsoft.com/office/drawing/2010/main" w="9525">
+                <a14:hiddenLine xmlns:a14="http://schemas.microsoft.com/office/drawing/2010/main" xmlns="" w="9525">
                   <a:solidFill>
                     <a:srgbClr val="000000"/>
                   </a:solidFill>
@@ -3615,7 +3616,7 @@
             </a:ln>
             <a:extLst>
               <a:ext uri="{91240B29-F687-4f45-9708-019B960494DF}">
-                <a14:hiddenLine xmlns="" xmlns:a14="http://schemas.microsoft.com/office/drawing/2010/main" w="9525">
+                <a14:hiddenLine xmlns:a14="http://schemas.microsoft.com/office/drawing/2010/main" xmlns="" w="9525">
                   <a:solidFill>
                     <a:srgbClr val="000000"/>
                   </a:solidFill>
@@ -3680,7 +3681,7 @@
             </a:ln>
             <a:extLst>
               <a:ext uri="{91240B29-F687-4f45-9708-019B960494DF}">
-                <a14:hiddenLine xmlns="" xmlns:a14="http://schemas.microsoft.com/office/drawing/2010/main" w="9525">
+                <a14:hiddenLine xmlns:a14="http://schemas.microsoft.com/office/drawing/2010/main" xmlns="" w="9525">
                   <a:solidFill>
                     <a:srgbClr val="000000"/>
                   </a:solidFill>
@@ -3742,7 +3743,7 @@
             </a:ln>
             <a:extLst>
               <a:ext uri="{91240B29-F687-4f45-9708-019B960494DF}">
-                <a14:hiddenLine xmlns="" xmlns:a14="http://schemas.microsoft.com/office/drawing/2010/main" w="9525">
+                <a14:hiddenLine xmlns:a14="http://schemas.microsoft.com/office/drawing/2010/main" xmlns="" w="9525">
                   <a:solidFill>
                     <a:srgbClr val="000000"/>
                   </a:solidFill>
@@ -3832,7 +3833,7 @@
             </a:ln>
             <a:extLst>
               <a:ext uri="{91240B29-F687-4f45-9708-019B960494DF}">
-                <a14:hiddenLine xmlns="" xmlns:a14="http://schemas.microsoft.com/office/drawing/2010/main" w="9525">
+                <a14:hiddenLine xmlns:a14="http://schemas.microsoft.com/office/drawing/2010/main" xmlns="" w="9525">
                   <a:solidFill>
                     <a:srgbClr val="000000"/>
                   </a:solidFill>
@@ -3922,7 +3923,7 @@
             </a:ln>
             <a:extLst>
               <a:ext uri="{91240B29-F687-4f45-9708-019B960494DF}">
-                <a14:hiddenLine xmlns="" xmlns:a14="http://schemas.microsoft.com/office/drawing/2010/main" w="9525">
+                <a14:hiddenLine xmlns:a14="http://schemas.microsoft.com/office/drawing/2010/main" xmlns="" w="9525">
                   <a:solidFill>
                     <a:srgbClr val="000000"/>
                   </a:solidFill>
@@ -3984,7 +3985,7 @@
             </a:ln>
             <a:extLst>
               <a:ext uri="{91240B29-F687-4f45-9708-019B960494DF}">
-                <a14:hiddenLine xmlns="" xmlns:a14="http://schemas.microsoft.com/office/drawing/2010/main" w="9525">
+                <a14:hiddenLine xmlns:a14="http://schemas.microsoft.com/office/drawing/2010/main" xmlns="" w="9525">
                   <a:solidFill>
                     <a:srgbClr val="000000"/>
                   </a:solidFill>
@@ -4104,7 +4105,7 @@
             </a:ln>
             <a:extLst>
               <a:ext uri="{91240B29-F687-4f45-9708-019B960494DF}">
-                <a14:hiddenLine xmlns="" xmlns:a14="http://schemas.microsoft.com/office/drawing/2010/main" w="9525">
+                <a14:hiddenLine xmlns:a14="http://schemas.microsoft.com/office/drawing/2010/main" xmlns="" w="9525">
                   <a:solidFill>
                     <a:srgbClr val="000000"/>
                   </a:solidFill>
@@ -4172,7 +4173,7 @@
             </a:ln>
             <a:extLst>
               <a:ext uri="{91240B29-F687-4f45-9708-019B960494DF}">
-                <a14:hiddenLine xmlns="" xmlns:a14="http://schemas.microsoft.com/office/drawing/2010/main" w="9525">
+                <a14:hiddenLine xmlns:a14="http://schemas.microsoft.com/office/drawing/2010/main" xmlns="" w="9525">
                   <a:solidFill>
                     <a:srgbClr val="000000"/>
                   </a:solidFill>
@@ -4262,7 +4263,7 @@
             </a:ln>
             <a:extLst>
               <a:ext uri="{91240B29-F687-4f45-9708-019B960494DF}">
-                <a14:hiddenLine xmlns="" xmlns:a14="http://schemas.microsoft.com/office/drawing/2010/main" w="9525">
+                <a14:hiddenLine xmlns:a14="http://schemas.microsoft.com/office/drawing/2010/main" xmlns="" w="9525">
                   <a:solidFill>
                     <a:srgbClr val="000000"/>
                   </a:solidFill>
@@ -8984,7 +8985,7 @@
           <a:noFill/>
           <a:extLst>
             <a:ext uri="{909E8E84-426E-40dd-AFC4-6F175D3DCCD1}">
-              <a14:hiddenFill xmlns="" xmlns:a14="http://schemas.microsoft.com/office/drawing/2010/main">
+              <a14:hiddenFill xmlns:a14="http://schemas.microsoft.com/office/drawing/2010/main" xmlns="">
                 <a:solidFill>
                   <a:srgbClr val="FFFFFF"/>
                 </a:solidFill>
@@ -9058,7 +9059,7 @@
               </a:ln>
               <a:extLst>
                 <a:ext uri="{91240B29-F687-4f45-9708-019B960494DF}">
-                  <a14:hiddenLine xmlns="" xmlns:a14="http://schemas.microsoft.com/office/drawing/2010/main" w="9525">
+                  <a14:hiddenLine xmlns:a14="http://schemas.microsoft.com/office/drawing/2010/main" xmlns="" w="9525">
                     <a:solidFill>
                       <a:srgbClr val="000000"/>
                     </a:solidFill>
@@ -9148,7 +9149,7 @@
               </a:ln>
               <a:extLst>
                 <a:ext uri="{91240B29-F687-4f45-9708-019B960494DF}">
-                  <a14:hiddenLine xmlns="" xmlns:a14="http://schemas.microsoft.com/office/drawing/2010/main" w="9525">
+                  <a14:hiddenLine xmlns:a14="http://schemas.microsoft.com/office/drawing/2010/main" xmlns="" w="9525">
                     <a:solidFill>
                       <a:srgbClr val="000000"/>
                     </a:solidFill>
@@ -9238,7 +9239,7 @@
               </a:ln>
               <a:extLst>
                 <a:ext uri="{91240B29-F687-4f45-9708-019B960494DF}">
-                  <a14:hiddenLine xmlns="" xmlns:a14="http://schemas.microsoft.com/office/drawing/2010/main" w="9525">
+                  <a14:hiddenLine xmlns:a14="http://schemas.microsoft.com/office/drawing/2010/main" xmlns="" w="9525">
                     <a:solidFill>
                       <a:srgbClr val="000000"/>
                     </a:solidFill>
@@ -9300,7 +9301,7 @@
               </a:ln>
               <a:extLst>
                 <a:ext uri="{91240B29-F687-4f45-9708-019B960494DF}">
-                  <a14:hiddenLine xmlns="" xmlns:a14="http://schemas.microsoft.com/office/drawing/2010/main" w="9525">
+                  <a14:hiddenLine xmlns:a14="http://schemas.microsoft.com/office/drawing/2010/main" xmlns="" w="9525">
                     <a:solidFill>
                       <a:srgbClr val="000000"/>
                     </a:solidFill>
@@ -9390,7 +9391,7 @@
               </a:ln>
               <a:extLst>
                 <a:ext uri="{91240B29-F687-4f45-9708-019B960494DF}">
-                  <a14:hiddenLine xmlns="" xmlns:a14="http://schemas.microsoft.com/office/drawing/2010/main" w="9525">
+                  <a14:hiddenLine xmlns:a14="http://schemas.microsoft.com/office/drawing/2010/main" xmlns="" w="9525">
                     <a:solidFill>
                       <a:srgbClr val="000000"/>
                     </a:solidFill>
@@ -9452,7 +9453,7 @@
               </a:ln>
               <a:extLst>
                 <a:ext uri="{91240B29-F687-4f45-9708-019B960494DF}">
-                  <a14:hiddenLine xmlns="" xmlns:a14="http://schemas.microsoft.com/office/drawing/2010/main" w="9525">
+                  <a14:hiddenLine xmlns:a14="http://schemas.microsoft.com/office/drawing/2010/main" xmlns="" w="9525">
                     <a:solidFill>
                       <a:srgbClr val="000000"/>
                     </a:solidFill>
@@ -9514,7 +9515,7 @@
               </a:ln>
               <a:extLst>
                 <a:ext uri="{91240B29-F687-4f45-9708-019B960494DF}">
-                  <a14:hiddenLine xmlns="" xmlns:a14="http://schemas.microsoft.com/office/drawing/2010/main" w="9525">
+                  <a14:hiddenLine xmlns:a14="http://schemas.microsoft.com/office/drawing/2010/main" xmlns="" w="9525">
                     <a:solidFill>
                       <a:srgbClr val="000000"/>
                     </a:solidFill>
@@ -9604,7 +9605,7 @@
               </a:ln>
               <a:extLst>
                 <a:ext uri="{91240B29-F687-4f45-9708-019B960494DF}">
-                  <a14:hiddenLine xmlns="" xmlns:a14="http://schemas.microsoft.com/office/drawing/2010/main" w="9525">
+                  <a14:hiddenLine xmlns:a14="http://schemas.microsoft.com/office/drawing/2010/main" xmlns="" w="9525">
                     <a:solidFill>
                       <a:srgbClr val="000000"/>
                     </a:solidFill>
@@ -9694,7 +9695,7 @@
               </a:ln>
               <a:extLst>
                 <a:ext uri="{91240B29-F687-4f45-9708-019B960494DF}">
-                  <a14:hiddenLine xmlns="" xmlns:a14="http://schemas.microsoft.com/office/drawing/2010/main" w="9525">
+                  <a14:hiddenLine xmlns:a14="http://schemas.microsoft.com/office/drawing/2010/main" xmlns="" w="9525">
                     <a:solidFill>
                       <a:srgbClr val="000000"/>
                     </a:solidFill>
@@ -9756,7 +9757,7 @@
               </a:ln>
               <a:extLst>
                 <a:ext uri="{91240B29-F687-4f45-9708-019B960494DF}">
-                  <a14:hiddenLine xmlns="" xmlns:a14="http://schemas.microsoft.com/office/drawing/2010/main" w="9525">
+                  <a14:hiddenLine xmlns:a14="http://schemas.microsoft.com/office/drawing/2010/main" xmlns="" w="9525">
                     <a:solidFill>
                       <a:srgbClr val="000000"/>
                     </a:solidFill>
@@ -9866,7 +9867,7 @@
               </a:ln>
               <a:extLst>
                 <a:ext uri="{91240B29-F687-4f45-9708-019B960494DF}">
-                  <a14:hiddenLine xmlns="" xmlns:a14="http://schemas.microsoft.com/office/drawing/2010/main" w="9525">
+                  <a14:hiddenLine xmlns:a14="http://schemas.microsoft.com/office/drawing/2010/main" xmlns="" w="9525">
                     <a:solidFill>
                       <a:srgbClr val="000000"/>
                     </a:solidFill>
@@ -9950,7 +9951,7 @@
               </a:ln>
               <a:extLst>
                 <a:ext uri="{91240B29-F687-4f45-9708-019B960494DF}">
-                  <a14:hiddenLine xmlns="" xmlns:a14="http://schemas.microsoft.com/office/drawing/2010/main" w="9525">
+                  <a14:hiddenLine xmlns:a14="http://schemas.microsoft.com/office/drawing/2010/main" xmlns="" w="9525">
                     <a:solidFill>
                       <a:srgbClr val="000000"/>
                     </a:solidFill>
@@ -10012,7 +10013,7 @@
               </a:ln>
               <a:extLst>
                 <a:ext uri="{91240B29-F687-4f45-9708-019B960494DF}">
-                  <a14:hiddenLine xmlns="" xmlns:a14="http://schemas.microsoft.com/office/drawing/2010/main" w="9525">
+                  <a14:hiddenLine xmlns:a14="http://schemas.microsoft.com/office/drawing/2010/main" xmlns="" w="9525">
                     <a:solidFill>
                       <a:srgbClr val="000000"/>
                     </a:solidFill>
@@ -10074,7 +10075,7 @@
               </a:ln>
               <a:extLst>
                 <a:ext uri="{91240B29-F687-4f45-9708-019B960494DF}">
-                  <a14:hiddenLine xmlns="" xmlns:a14="http://schemas.microsoft.com/office/drawing/2010/main" w="9525">
+                  <a14:hiddenLine xmlns:a14="http://schemas.microsoft.com/office/drawing/2010/main" xmlns="" w="9525">
                     <a:solidFill>
                       <a:srgbClr val="000000"/>
                     </a:solidFill>
@@ -10164,7 +10165,7 @@
               </a:ln>
               <a:extLst>
                 <a:ext uri="{91240B29-F687-4f45-9708-019B960494DF}">
-                  <a14:hiddenLine xmlns="" xmlns:a14="http://schemas.microsoft.com/office/drawing/2010/main" w="9525">
+                  <a14:hiddenLine xmlns:a14="http://schemas.microsoft.com/office/drawing/2010/main" xmlns="" w="9525">
                     <a:solidFill>
                       <a:srgbClr val="000000"/>
                     </a:solidFill>
@@ -10198,7 +10199,7 @@
               </a:ln>
               <a:extLst>
                 <a:ext uri="{91240B29-F687-4f45-9708-019B960494DF}">
-                  <a14:hiddenLine xmlns="" xmlns:a14="http://schemas.microsoft.com/office/drawing/2010/main" w="9525">
+                  <a14:hiddenLine xmlns:a14="http://schemas.microsoft.com/office/drawing/2010/main" xmlns="" w="9525">
                     <a:solidFill>
                       <a:srgbClr val="000000"/>
                     </a:solidFill>
@@ -10263,7 +10264,7 @@
               </a:ln>
               <a:extLst>
                 <a:ext uri="{91240B29-F687-4f45-9708-019B960494DF}">
-                  <a14:hiddenLine xmlns="" xmlns:a14="http://schemas.microsoft.com/office/drawing/2010/main" w="9525">
+                  <a14:hiddenLine xmlns:a14="http://schemas.microsoft.com/office/drawing/2010/main" xmlns="" w="9525">
                     <a:solidFill>
                       <a:srgbClr val="000000"/>
                     </a:solidFill>
@@ -10353,7 +10354,7 @@
               </a:ln>
               <a:extLst>
                 <a:ext uri="{91240B29-F687-4f45-9708-019B960494DF}">
-                  <a14:hiddenLine xmlns="" xmlns:a14="http://schemas.microsoft.com/office/drawing/2010/main" w="9525">
+                  <a14:hiddenLine xmlns:a14="http://schemas.microsoft.com/office/drawing/2010/main" xmlns="" w="9525">
                     <a:solidFill>
                       <a:srgbClr val="000000"/>
                     </a:solidFill>
@@ -10415,7 +10416,7 @@
               </a:ln>
               <a:extLst>
                 <a:ext uri="{91240B29-F687-4f45-9708-019B960494DF}">
-                  <a14:hiddenLine xmlns="" xmlns:a14="http://schemas.microsoft.com/office/drawing/2010/main" w="9525">
+                  <a14:hiddenLine xmlns:a14="http://schemas.microsoft.com/office/drawing/2010/main" xmlns="" w="9525">
                     <a:solidFill>
                       <a:srgbClr val="000000"/>
                     </a:solidFill>
@@ -10505,7 +10506,7 @@
               </a:ln>
               <a:extLst>
                 <a:ext uri="{91240B29-F687-4f45-9708-019B960494DF}">
-                  <a14:hiddenLine xmlns="" xmlns:a14="http://schemas.microsoft.com/office/drawing/2010/main" w="9525">
+                  <a14:hiddenLine xmlns:a14="http://schemas.microsoft.com/office/drawing/2010/main" xmlns="" w="9525">
                     <a:solidFill>
                       <a:srgbClr val="000000"/>
                     </a:solidFill>
@@ -10570,7 +10571,7 @@
               </a:ln>
               <a:extLst>
                 <a:ext uri="{91240B29-F687-4f45-9708-019B960494DF}">
-                  <a14:hiddenLine xmlns="" xmlns:a14="http://schemas.microsoft.com/office/drawing/2010/main" w="9525">
+                  <a14:hiddenLine xmlns:a14="http://schemas.microsoft.com/office/drawing/2010/main" xmlns="" w="9525">
                     <a:solidFill>
                       <a:srgbClr val="000000"/>
                     </a:solidFill>
@@ -10632,7 +10633,7 @@
               </a:ln>
               <a:extLst>
                 <a:ext uri="{91240B29-F687-4f45-9708-019B960494DF}">
-                  <a14:hiddenLine xmlns="" xmlns:a14="http://schemas.microsoft.com/office/drawing/2010/main" w="9525">
+                  <a14:hiddenLine xmlns:a14="http://schemas.microsoft.com/office/drawing/2010/main" xmlns="" w="9525">
                     <a:solidFill>
                       <a:srgbClr val="000000"/>
                     </a:solidFill>
@@ -10722,7 +10723,7 @@
               </a:ln>
               <a:extLst>
                 <a:ext uri="{91240B29-F687-4f45-9708-019B960494DF}">
-                  <a14:hiddenLine xmlns="" xmlns:a14="http://schemas.microsoft.com/office/drawing/2010/main" w="9525">
+                  <a14:hiddenLine xmlns:a14="http://schemas.microsoft.com/office/drawing/2010/main" xmlns="" w="9525">
                     <a:solidFill>
                       <a:srgbClr val="000000"/>
                     </a:solidFill>
@@ -10812,7 +10813,7 @@
               </a:ln>
               <a:extLst>
                 <a:ext uri="{91240B29-F687-4f45-9708-019B960494DF}">
-                  <a14:hiddenLine xmlns="" xmlns:a14="http://schemas.microsoft.com/office/drawing/2010/main" w="9525">
+                  <a14:hiddenLine xmlns:a14="http://schemas.microsoft.com/office/drawing/2010/main" xmlns="" w="9525">
                     <a:solidFill>
                       <a:srgbClr val="000000"/>
                     </a:solidFill>
@@ -10877,7 +10878,7 @@
               </a:ln>
               <a:extLst>
                 <a:ext uri="{91240B29-F687-4f45-9708-019B960494DF}">
-                  <a14:hiddenLine xmlns="" xmlns:a14="http://schemas.microsoft.com/office/drawing/2010/main" w="9525">
+                  <a14:hiddenLine xmlns:a14="http://schemas.microsoft.com/office/drawing/2010/main" xmlns="" w="9525">
                     <a:solidFill>
                       <a:srgbClr val="000000"/>
                     </a:solidFill>
@@ -10997,7 +10998,7 @@
               </a:ln>
               <a:extLst>
                 <a:ext uri="{91240B29-F687-4f45-9708-019B960494DF}">
-                  <a14:hiddenLine xmlns="" xmlns:a14="http://schemas.microsoft.com/office/drawing/2010/main" w="9525">
+                  <a14:hiddenLine xmlns:a14="http://schemas.microsoft.com/office/drawing/2010/main" xmlns="" w="9525">
                     <a:solidFill>
                       <a:srgbClr val="000000"/>
                     </a:solidFill>
@@ -11095,7 +11096,7 @@
               </a:ln>
               <a:extLst>
                 <a:ext uri="{91240B29-F687-4f45-9708-019B960494DF}">
-                  <a14:hiddenLine xmlns="" xmlns:a14="http://schemas.microsoft.com/office/drawing/2010/main" w="9525">
+                  <a14:hiddenLine xmlns:a14="http://schemas.microsoft.com/office/drawing/2010/main" xmlns="" w="9525">
                     <a:solidFill>
                       <a:srgbClr val="000000"/>
                     </a:solidFill>
@@ -11210,7 +11211,7 @@
               </a:ln>
               <a:extLst>
                 <a:ext uri="{91240B29-F687-4f45-9708-019B960494DF}">
-                  <a14:hiddenLine xmlns="" xmlns:a14="http://schemas.microsoft.com/office/drawing/2010/main" w="9525">
+                  <a14:hiddenLine xmlns:a14="http://schemas.microsoft.com/office/drawing/2010/main" xmlns="" w="9525">
                     <a:solidFill>
                       <a:srgbClr val="000000"/>
                     </a:solidFill>
@@ -11300,7 +11301,7 @@
               </a:ln>
               <a:extLst>
                 <a:ext uri="{91240B29-F687-4f45-9708-019B960494DF}">
-                  <a14:hiddenLine xmlns="" xmlns:a14="http://schemas.microsoft.com/office/drawing/2010/main" w="9525">
+                  <a14:hiddenLine xmlns:a14="http://schemas.microsoft.com/office/drawing/2010/main" xmlns="" w="9525">
                     <a:solidFill>
                       <a:srgbClr val="000000"/>
                     </a:solidFill>
@@ -11365,7 +11366,7 @@
               </a:ln>
               <a:extLst>
                 <a:ext uri="{91240B29-F687-4f45-9708-019B960494DF}">
-                  <a14:hiddenLine xmlns="" xmlns:a14="http://schemas.microsoft.com/office/drawing/2010/main" w="9525">
+                  <a14:hiddenLine xmlns:a14="http://schemas.microsoft.com/office/drawing/2010/main" xmlns="" w="9525">
                     <a:solidFill>
                       <a:srgbClr val="000000"/>
                     </a:solidFill>
@@ -11455,7 +11456,7 @@
               </a:ln>
               <a:extLst>
                 <a:ext uri="{91240B29-F687-4f45-9708-019B960494DF}">
-                  <a14:hiddenLine xmlns="" xmlns:a14="http://schemas.microsoft.com/office/drawing/2010/main" w="9525">
+                  <a14:hiddenLine xmlns:a14="http://schemas.microsoft.com/office/drawing/2010/main" xmlns="" w="9525">
                     <a:solidFill>
                       <a:srgbClr val="000000"/>
                     </a:solidFill>
@@ -11523,7 +11524,7 @@
               </a:ln>
               <a:extLst>
                 <a:ext uri="{91240B29-F687-4f45-9708-019B960494DF}">
-                  <a14:hiddenLine xmlns="" xmlns:a14="http://schemas.microsoft.com/office/drawing/2010/main" w="9525">
+                  <a14:hiddenLine xmlns:a14="http://schemas.microsoft.com/office/drawing/2010/main" xmlns="" w="9525">
                     <a:solidFill>
                       <a:srgbClr val="000000"/>
                     </a:solidFill>
@@ -11613,7 +11614,7 @@
               </a:ln>
               <a:extLst>
                 <a:ext uri="{91240B29-F687-4f45-9708-019B960494DF}">
-                  <a14:hiddenLine xmlns="" xmlns:a14="http://schemas.microsoft.com/office/drawing/2010/main" w="9525">
+                  <a14:hiddenLine xmlns:a14="http://schemas.microsoft.com/office/drawing/2010/main" xmlns="" w="9525">
                     <a:solidFill>
                       <a:srgbClr val="000000"/>
                     </a:solidFill>
@@ -11681,7 +11682,7 @@
               </a:ln>
               <a:extLst>
                 <a:ext uri="{91240B29-F687-4f45-9708-019B960494DF}">
-                  <a14:hiddenLine xmlns="" xmlns:a14="http://schemas.microsoft.com/office/drawing/2010/main" w="9525">
+                  <a14:hiddenLine xmlns:a14="http://schemas.microsoft.com/office/drawing/2010/main" xmlns="" w="9525">
                     <a:solidFill>
                       <a:srgbClr val="000000"/>
                     </a:solidFill>
@@ -11771,7 +11772,7 @@
               </a:ln>
               <a:extLst>
                 <a:ext uri="{91240B29-F687-4f45-9708-019B960494DF}">
-                  <a14:hiddenLine xmlns="" xmlns:a14="http://schemas.microsoft.com/office/drawing/2010/main" w="9525">
+                  <a14:hiddenLine xmlns:a14="http://schemas.microsoft.com/office/drawing/2010/main" xmlns="" w="9525">
                     <a:solidFill>
                       <a:srgbClr val="000000"/>
                     </a:solidFill>
@@ -11805,7 +11806,7 @@
               </a:ln>
               <a:extLst>
                 <a:ext uri="{91240B29-F687-4f45-9708-019B960494DF}">
-                  <a14:hiddenLine xmlns="" xmlns:a14="http://schemas.microsoft.com/office/drawing/2010/main" w="9525">
+                  <a14:hiddenLine xmlns:a14="http://schemas.microsoft.com/office/drawing/2010/main" xmlns="" w="9525">
                     <a:solidFill>
                       <a:srgbClr val="000000"/>
                     </a:solidFill>
@@ -12971,6 +12972,101 @@
         <p:spPr>
           <a:xfrm>
             <a:off x="960258" y="0"/>
+            <a:ext cx="9905998" cy="831273"/>
+          </a:xfrm>
+        </p:spPr>
+        <p:txBody>
+          <a:bodyPr/>
+          <a:lstStyle/>
+          <a:p>
+            <a:pPr algn="ctr"/>
+            <a:r>
+              <a:rPr lang="es-ES" dirty="0"/>
+              <a:t>Codificación y graficas en R</a:t>
+            </a:r>
+            <a:endParaRPr lang="es-CO" dirty="0"/>
+          </a:p>
+        </p:txBody>
+      </p:sp>
+      <p:pic>
+        <p:nvPicPr>
+          <p:cNvPr id="4" name="Imagen 3">
+            <a:extLst>
+              <a:ext uri="{FF2B5EF4-FFF2-40B4-BE49-F238E27FC236}">
+                <a16:creationId xmlns:a16="http://schemas.microsoft.com/office/drawing/2014/main" id="{47A76A20-DF28-2870-D672-15F35A61A627}"/>
+              </a:ext>
+            </a:extLst>
+          </p:cNvPr>
+          <p:cNvPicPr>
+            <a:picLocks noChangeAspect="1"/>
+          </p:cNvPicPr>
+          <p:nvPr/>
+        </p:nvPicPr>
+        <p:blipFill>
+          <a:blip r:embed="rId2"/>
+          <a:stretch>
+            <a:fillRect/>
+          </a:stretch>
+        </p:blipFill>
+        <p:spPr>
+          <a:xfrm>
+            <a:off x="3232727" y="831273"/>
+            <a:ext cx="5872917" cy="5550045"/>
+          </a:xfrm>
+          <a:prstGeom prst="rect">
+            <a:avLst/>
+          </a:prstGeom>
+        </p:spPr>
+      </p:pic>
+    </p:spTree>
+    <p:extLst>
+      <p:ext uri="{BB962C8B-B14F-4D97-AF65-F5344CB8AC3E}">
+        <p14:creationId xmlns:p14="http://schemas.microsoft.com/office/powerpoint/2010/main" val="4270483124"/>
+      </p:ext>
+    </p:extLst>
+  </p:cSld>
+  <p:clrMapOvr>
+    <a:masterClrMapping/>
+  </p:clrMapOvr>
+</p:sld>
+</file>
+
+<file path=ppt/slides/slide16.xml><?xml version="1.0" encoding="utf-8"?>
+<p:sld xmlns:a="http://schemas.openxmlformats.org/drawingml/2006/main" xmlns:r="http://schemas.openxmlformats.org/officeDocument/2006/relationships" xmlns:p="http://schemas.openxmlformats.org/presentationml/2006/main">
+  <p:cSld>
+    <p:spTree>
+      <p:nvGrpSpPr>
+        <p:cNvPr id="1" name=""/>
+        <p:cNvGrpSpPr/>
+        <p:nvPr/>
+      </p:nvGrpSpPr>
+      <p:grpSpPr>
+        <a:xfrm>
+          <a:off x="0" y="0"/>
+          <a:ext cx="0" cy="0"/>
+          <a:chOff x="0" y="0"/>
+          <a:chExt cx="0" cy="0"/>
+        </a:xfrm>
+      </p:grpSpPr>
+      <p:sp>
+        <p:nvSpPr>
+          <p:cNvPr id="2" name="Título 1">
+            <a:extLst>
+              <a:ext uri="{FF2B5EF4-FFF2-40B4-BE49-F238E27FC236}">
+                <a16:creationId xmlns:a16="http://schemas.microsoft.com/office/drawing/2014/main" id="{C949A600-41F2-B23D-0917-71DAA1E1F90D}"/>
+              </a:ext>
+            </a:extLst>
+          </p:cNvPr>
+          <p:cNvSpPr>
+            <a:spLocks noGrp="1"/>
+          </p:cNvSpPr>
+          <p:nvPr>
+            <p:ph type="title"/>
+          </p:nvPr>
+        </p:nvSpPr>
+        <p:spPr>
+          <a:xfrm>
+            <a:off x="960258" y="0"/>
             <a:ext cx="9905998" cy="1478570"/>
           </a:xfrm>
         </p:spPr>

</xml_diff>